<commit_message>
Dodge and stack examples in data-viz-02
</commit_message>
<xml_diff>
--- a/data-viz-02/component/exercise-mortality-by-sex.pptx
+++ b/data-viz-02/component/exercise-mortality-by-sex.pptx
@@ -5,7 +5,7 @@
     <p:sldMasterId id="2147483648" r:id="rId1"/>
   </p:sldMasterIdLst>
   <p:notesMasterIdLst>
-    <p:NotesMasterId r:id="rId9"/>
+    <p:NotesMasterId r:id="rId12"/>
   </p:notesMasterIdLst>
   <p:sldIdLst>
     <p:sldId id="256" r:id="rId2"/>
@@ -15,6 +15,9 @@
     <p:sldId id="260" r:id="rId6"/>
     <p:sldId id="261" r:id="rId7"/>
     <p:sldId id="262" r:id="rId8"/>
+    <p:sldId id="263" r:id="rId9"/>
+    <p:sldId id="264" r:id="rId10"/>
+    <p:sldId id="265" r:id="rId11"/>
   </p:sldIdLst>
   <p:sldSz cx="9144000" cy="6858000" type="screen4x3"/>
   <p:notesSz cx="6858000" cy="9144000"/>
@@ -4274,6 +4277,94 @@
 </p:sld>
 </file>
 
+<file path=ppt/slides/slide10.xml><?xml version="1.0" encoding="utf-8"?>
+<p:sld xmlns:a="http://schemas.openxmlformats.org/drawingml/2006/main" xmlns:r="http://schemas.openxmlformats.org/officeDocument/2006/relationships" xmlns:p="http://schemas.openxmlformats.org/presentationml/2006/main">
+  <p:cSld>
+    <p:spTree>
+      <p:nvGrpSpPr>
+        <p:cNvPr id="1" name=""/>
+        <p:cNvGrpSpPr/>
+        <p:nvPr/>
+      </p:nvGrpSpPr>
+      <p:grpSpPr>
+        <a:xfrm>
+          <a:off x="0" y="0"/>
+          <a:ext cx="0" cy="0"/>
+          <a:chOff x="0" y="0"/>
+          <a:chExt cx="0" cy="0"/>
+        </a:xfrm>
+      </p:grpSpPr>
+      <p:sp>
+        <p:nvSpPr>
+          <p:cNvPr id="2" name="Title 1"/>
+          <p:cNvSpPr>
+            <a:spLocks noGrp="1"/>
+          </p:cNvSpPr>
+          <p:nvPr>
+            <p:ph type="title"/>
+          </p:nvPr>
+        </p:nvSpPr>
+        <p:spPr/>
+        <p:txBody>
+          <a:bodyPr/>
+          <a:lstStyle/>
+          <a:p>
+            <a:pPr lvl="0" marL="0" indent="0">
+              <a:buNone/>
+            </a:pPr>
+            <a:r>
+              <a:rPr/>
+              <a:t>Exercise,</a:t>
+            </a:r>
+            <a:r>
+              <a:rPr/>
+              <a:t> </a:t>
+            </a:r>
+            <a:r>
+              <a:rPr/>
+              <a:t>Tableau</a:t>
+            </a:r>
+            <a:r>
+              <a:rPr/>
+              <a:t> </a:t>
+            </a:r>
+            <a:r>
+              <a:rPr/>
+              <a:t>output</a:t>
+            </a:r>
+          </a:p>
+        </p:txBody>
+      </p:sp>
+      <p:sp>
+        <p:nvSpPr>
+          <p:cNvPr id="3" name="Content Placeholder 2"/>
+          <p:cNvSpPr>
+            <a:spLocks noGrp="1"/>
+          </p:cNvSpPr>
+          <p:nvPr>
+            <p:ph idx="1"/>
+          </p:nvPr>
+        </p:nvSpPr>
+        <p:spPr/>
+        <p:txBody>
+          <a:bodyPr/>
+          <a:lstStyle/>
+          <a:p>
+            <a:pPr lvl="0" marL="0" indent="0">
+              <a:buNone/>
+            </a:pPr>
+            <a:r>
+              <a:rPr/>
+              <a:t>((Tableau results))</a:t>
+            </a:r>
+          </a:p>
+        </p:txBody>
+      </p:sp>
+    </p:spTree>
+  </p:cSld>
+</p:sld>
+</file>
+
 <file path=ppt/slides/slide2.xml><?xml version="1.0" encoding="utf-8"?>
 <p:sld xmlns:a="http://schemas.openxmlformats.org/drawingml/2006/main" xmlns:r="http://schemas.openxmlformats.org/officeDocument/2006/relationships" xmlns:p="http://schemas.openxmlformats.org/presentationml/2006/main">
   <p:cSld>
@@ -4358,7 +4449,7 @@
             <a:pPr lvl="1"/>
             <a:r>
               <a:rPr/>
-              <a:t>Draw a bar chart showing counts involving both mortality and gender. Use a panel, then stacking, then dodging. Which do you like best?</a:t>
+              <a:t>Draw a bar chart showing counts involving both mortality and gender. Use stacked bars, then dodged bars. Which do you like best?</a:t>
             </a:r>
           </a:p>
         </p:txBody>
@@ -4705,7 +4796,7 @@
       </p:sp>
       <p:pic>
         <p:nvPicPr>
-          <p:cNvPr descr="../images/r/mortality-by-gender-panel.png" id="0" name="Picture 1"/>
+          <p:cNvPr descr="../images/r/stack-1.png" id="0" name="Picture 1"/>
           <p:cNvPicPr>
             <a:picLocks noGrp="1" noChangeAspect="1"/>
           </p:cNvPicPr>
@@ -4783,7 +4874,7 @@
             </a:r>
             <a:r>
               <a:rPr/>
-              <a:t>Tableau</a:t>
+              <a:t>R</a:t>
             </a:r>
             <a:r>
               <a:rPr/>
@@ -4796,14 +4887,66 @@
           </a:p>
         </p:txBody>
       </p:sp>
-      <p:sp>
-        <p:nvSpPr>
-          <p:cNvPr id="3" name="Content Placeholder 2"/>
-          <p:cNvSpPr>
-            <a:spLocks noGrp="1"/>
-          </p:cNvSpPr>
-          <p:nvPr>
-            <p:ph idx="1"/>
+      <p:pic>
+        <p:nvPicPr>
+          <p:cNvPr descr="../images/r/stack-2.png" id="0" name="Picture 1"/>
+          <p:cNvPicPr>
+            <a:picLocks noGrp="1" noChangeAspect="1"/>
+          </p:cNvPicPr>
+          <p:nvPr/>
+        </p:nvPicPr>
+        <p:blipFill>
+          <a:blip r:embed="rId2"/>
+          <a:stretch>
+            <a:fillRect/>
+          </a:stretch>
+        </p:blipFill>
+        <p:spPr bwMode="auto">
+          <a:xfrm>
+            <a:off x="2311400" y="1600200"/>
+            <a:ext cx="4521200" cy="4521200"/>
+          </a:xfrm>
+          <a:prstGeom prst="rect">
+            <a:avLst/>
+          </a:prstGeom>
+          <a:noFill/>
+          <a:ln w="9525">
+            <a:noFill/>
+            <a:headEnd/>
+            <a:tailEnd/>
+          </a:ln>
+        </p:spPr>
+      </p:pic>
+    </p:spTree>
+  </p:cSld>
+</p:sld>
+</file>
+
+<file path=ppt/slides/slide8.xml><?xml version="1.0" encoding="utf-8"?>
+<p:sld xmlns:a="http://schemas.openxmlformats.org/drawingml/2006/main" xmlns:r="http://schemas.openxmlformats.org/officeDocument/2006/relationships" xmlns:p="http://schemas.openxmlformats.org/presentationml/2006/main">
+  <p:cSld>
+    <p:spTree>
+      <p:nvGrpSpPr>
+        <p:cNvPr id="1" name=""/>
+        <p:cNvGrpSpPr/>
+        <p:nvPr/>
+      </p:nvGrpSpPr>
+      <p:grpSpPr>
+        <a:xfrm>
+          <a:off x="0" y="0"/>
+          <a:ext cx="0" cy="0"/>
+          <a:chOff x="0" y="0"/>
+          <a:chExt cx="0" cy="0"/>
+        </a:xfrm>
+      </p:grpSpPr>
+      <p:sp>
+        <p:nvSpPr>
+          <p:cNvPr id="2" name="Title 1"/>
+          <p:cNvSpPr>
+            <a:spLocks noGrp="1"/>
+          </p:cNvSpPr>
+          <p:nvPr>
+            <p:ph type="title"/>
           </p:nvPr>
         </p:nvSpPr>
         <p:spPr/>
@@ -4816,11 +4959,150 @@
             </a:pPr>
             <a:r>
               <a:rPr/>
-              <a:t>((Tableau results))</a:t>
-            </a:r>
-          </a:p>
-        </p:txBody>
-      </p:sp>
+              <a:t>Exercise,</a:t>
+            </a:r>
+            <a:r>
+              <a:rPr/>
+              <a:t> </a:t>
+            </a:r>
+            <a:r>
+              <a:rPr/>
+              <a:t>R</a:t>
+            </a:r>
+            <a:r>
+              <a:rPr/>
+              <a:t> </a:t>
+            </a:r>
+            <a:r>
+              <a:rPr/>
+              <a:t>output</a:t>
+            </a:r>
+          </a:p>
+        </p:txBody>
+      </p:sp>
+      <p:pic>
+        <p:nvPicPr>
+          <p:cNvPr descr="../images/r/dodge-1.png" id="0" name="Picture 1"/>
+          <p:cNvPicPr>
+            <a:picLocks noGrp="1" noChangeAspect="1"/>
+          </p:cNvPicPr>
+          <p:nvPr/>
+        </p:nvPicPr>
+        <p:blipFill>
+          <a:blip r:embed="rId2"/>
+          <a:stretch>
+            <a:fillRect/>
+          </a:stretch>
+        </p:blipFill>
+        <p:spPr bwMode="auto">
+          <a:xfrm>
+            <a:off x="2311400" y="1600200"/>
+            <a:ext cx="4521200" cy="4521200"/>
+          </a:xfrm>
+          <a:prstGeom prst="rect">
+            <a:avLst/>
+          </a:prstGeom>
+          <a:noFill/>
+          <a:ln w="9525">
+            <a:noFill/>
+            <a:headEnd/>
+            <a:tailEnd/>
+          </a:ln>
+        </p:spPr>
+      </p:pic>
+    </p:spTree>
+  </p:cSld>
+</p:sld>
+</file>
+
+<file path=ppt/slides/slide9.xml><?xml version="1.0" encoding="utf-8"?>
+<p:sld xmlns:a="http://schemas.openxmlformats.org/drawingml/2006/main" xmlns:r="http://schemas.openxmlformats.org/officeDocument/2006/relationships" xmlns:p="http://schemas.openxmlformats.org/presentationml/2006/main">
+  <p:cSld>
+    <p:spTree>
+      <p:nvGrpSpPr>
+        <p:cNvPr id="1" name=""/>
+        <p:cNvGrpSpPr/>
+        <p:nvPr/>
+      </p:nvGrpSpPr>
+      <p:grpSpPr>
+        <a:xfrm>
+          <a:off x="0" y="0"/>
+          <a:ext cx="0" cy="0"/>
+          <a:chOff x="0" y="0"/>
+          <a:chExt cx="0" cy="0"/>
+        </a:xfrm>
+      </p:grpSpPr>
+      <p:sp>
+        <p:nvSpPr>
+          <p:cNvPr id="2" name="Title 1"/>
+          <p:cNvSpPr>
+            <a:spLocks noGrp="1"/>
+          </p:cNvSpPr>
+          <p:nvPr>
+            <p:ph type="title"/>
+          </p:nvPr>
+        </p:nvSpPr>
+        <p:spPr/>
+        <p:txBody>
+          <a:bodyPr/>
+          <a:lstStyle/>
+          <a:p>
+            <a:pPr lvl="0" marL="0" indent="0">
+              <a:buNone/>
+            </a:pPr>
+            <a:r>
+              <a:rPr/>
+              <a:t>Exercise,</a:t>
+            </a:r>
+            <a:r>
+              <a:rPr/>
+              <a:t> </a:t>
+            </a:r>
+            <a:r>
+              <a:rPr/>
+              <a:t>R</a:t>
+            </a:r>
+            <a:r>
+              <a:rPr/>
+              <a:t> </a:t>
+            </a:r>
+            <a:r>
+              <a:rPr/>
+              <a:t>output</a:t>
+            </a:r>
+          </a:p>
+        </p:txBody>
+      </p:sp>
+      <p:pic>
+        <p:nvPicPr>
+          <p:cNvPr descr="../images/r/dodge-2.png" id="0" name="Picture 1"/>
+          <p:cNvPicPr>
+            <a:picLocks noGrp="1" noChangeAspect="1"/>
+          </p:cNvPicPr>
+          <p:nvPr/>
+        </p:nvPicPr>
+        <p:blipFill>
+          <a:blip r:embed="rId2"/>
+          <a:stretch>
+            <a:fillRect/>
+          </a:stretch>
+        </p:blipFill>
+        <p:spPr bwMode="auto">
+          <a:xfrm>
+            <a:off x="2311400" y="1600200"/>
+            <a:ext cx="4521200" cy="4521200"/>
+          </a:xfrm>
+          <a:prstGeom prst="rect">
+            <a:avLst/>
+          </a:prstGeom>
+          <a:noFill/>
+          <a:ln w="9525">
+            <a:noFill/>
+            <a:headEnd/>
+            <a:tailEnd/>
+          </a:ln>
+        </p:spPr>
+      </p:pic>
     </p:spTree>
   </p:cSld>
 </p:sld>

</xml_diff>

<commit_message>
Added normalize options to data-viz-02.
</commit_message>
<xml_diff>
--- a/data-viz-02/component/exercise-mortality-by-sex.pptx
+++ b/data-viz-02/component/exercise-mortality-by-sex.pptx
@@ -1155,6 +1155,940 @@
             <a:fld id="{18BDFEC3-8487-43E8-A154-7C12CBC1FFF2}" type="slidenum">
               <a:rPr lang="en-US"/>
               <a:t>2</a:t>
+            </a:fld>
+            <a:endParaRPr lang="en-US"/>
+          </a:p>
+        </p:txBody>
+      </p:sp>
+    </p:spTree>
+  </p:cSld>
+</p:notes>
+</file>
+
+<file path=ppt/notesSlides/notesSlide2.xml><?xml version="1.0" encoding="utf-8"?>
+<p:notes xmlns:a="http://schemas.openxmlformats.org/drawingml/2006/main" xmlns:r="http://schemas.openxmlformats.org/officeDocument/2006/relationships" xmlns:p="http://schemas.openxmlformats.org/presentationml/2006/main">
+  <p:cSld>
+    <p:spTree>
+      <p:nvGrpSpPr>
+        <p:cNvPr id="1" name=""/>
+        <p:cNvGrpSpPr/>
+        <p:nvPr/>
+      </p:nvGrpSpPr>
+      <p:grpSpPr>
+        <a:xfrm>
+          <a:off x="0" y="0"/>
+          <a:ext cx="0" cy="0"/>
+          <a:chOff x="0" y="0"/>
+          <a:chExt cx="0" cy="0"/>
+        </a:xfrm>
+      </p:grpSpPr>
+      <p:sp>
+        <p:nvSpPr>
+          <p:cNvPr id="2" name="Slide Image Placeholder 1"/>
+          <p:cNvSpPr>
+            <a:spLocks noGrp="1" noRot="1" noChangeAspect="1"/>
+          </p:cNvSpPr>
+          <p:nvPr>
+            <p:ph type="sldImg"/>
+          </p:nvPr>
+        </p:nvSpPr>
+        <p:spPr/>
+      </p:sp>
+      <p:sp>
+        <p:nvSpPr>
+          <p:cNvPr id="3" name="Notes Placeholder 2"/>
+          <p:cNvSpPr>
+            <a:spLocks noGrp="1"/>
+          </p:cNvSpPr>
+          <p:nvPr>
+            <p:ph type="body" idx="1"/>
+          </p:nvPr>
+        </p:nvSpPr>
+        <p:spPr/>
+        <p:txBody>
+          <a:bodyPr/>
+          <a:lstStyle/>
+          <a:p>
+            <a:pPr lvl="0" marL="0" indent="0">
+              <a:buNone/>
+            </a:pPr>
+            <a:r>
+              <a:rPr/>
+              <a:t>Here</a:t>
+            </a:r>
+            <a:r>
+              <a:rPr/>
+              <a:t> </a:t>
+            </a:r>
+            <a:r>
+              <a:rPr/>
+              <a:t>is</a:t>
+            </a:r>
+            <a:r>
+              <a:rPr/>
+              <a:t> </a:t>
+            </a:r>
+            <a:r>
+              <a:rPr/>
+              <a:t>the</a:t>
+            </a:r>
+            <a:r>
+              <a:rPr/>
+              <a:t> </a:t>
+            </a:r>
+            <a:r>
+              <a:rPr/>
+              <a:t>Python</a:t>
+            </a:r>
+            <a:r>
+              <a:rPr/>
+              <a:t> </a:t>
+            </a:r>
+            <a:r>
+              <a:rPr/>
+              <a:t>code.</a:t>
+            </a:r>
+            <a:r>
+              <a:rPr/>
+              <a:t> </a:t>
+            </a:r>
+            <a:r>
+              <a:rPr/>
+              <a:t>Notice</a:t>
+            </a:r>
+            <a:r>
+              <a:rPr/>
+              <a:t> </a:t>
+            </a:r>
+            <a:r>
+              <a:rPr/>
+              <a:t>that</a:t>
+            </a:r>
+            <a:r>
+              <a:rPr/>
+              <a:t> </a:t>
+            </a:r>
+            <a:r>
+              <a:rPr/>
+              <a:t>there</a:t>
+            </a:r>
+            <a:r>
+              <a:rPr/>
+              <a:t> </a:t>
+            </a:r>
+            <a:r>
+              <a:rPr/>
+              <a:t>are</a:t>
+            </a:r>
+            <a:r>
+              <a:rPr/>
+              <a:t> </a:t>
+            </a:r>
+            <a:r>
+              <a:rPr/>
+              <a:t>two</a:t>
+            </a:r>
+            <a:r>
+              <a:rPr/>
+              <a:t> </a:t>
+            </a:r>
+            <a:r>
+              <a:rPr/>
+              <a:t>different</a:t>
+            </a:r>
+            <a:r>
+              <a:rPr/>
+              <a:t> </a:t>
+            </a:r>
+            <a:r>
+              <a:rPr/>
+              <a:t>approaches.</a:t>
+            </a:r>
+          </a:p>
+        </p:txBody>
+      </p:sp>
+      <p:sp>
+        <p:nvSpPr>
+          <p:cNvPr id="4" name="Slide Number Placeholder 3"/>
+          <p:cNvSpPr>
+            <a:spLocks noGrp="1"/>
+          </p:cNvSpPr>
+          <p:nvPr>
+            <p:ph type="sldNum" sz="quarter" idx="10"/>
+          </p:nvPr>
+        </p:nvSpPr>
+        <p:spPr/>
+        <p:txBody>
+          <a:bodyPr/>
+          <a:lstStyle/>
+          <a:p>
+            <a:fld id="{18BDFEC3-8487-43E8-A154-7C12CBC1FFF2}" type="slidenum">
+              <a:rPr lang="en-US"/>
+              <a:t>3</a:t>
+            </a:fld>
+            <a:endParaRPr lang="en-US"/>
+          </a:p>
+        </p:txBody>
+      </p:sp>
+    </p:spTree>
+  </p:cSld>
+</p:notes>
+</file>
+
+<file path=ppt/notesSlides/notesSlide3.xml><?xml version="1.0" encoding="utf-8"?>
+<p:notes xmlns:a="http://schemas.openxmlformats.org/drawingml/2006/main" xmlns:r="http://schemas.openxmlformats.org/officeDocument/2006/relationships" xmlns:p="http://schemas.openxmlformats.org/presentationml/2006/main">
+  <p:cSld>
+    <p:spTree>
+      <p:nvGrpSpPr>
+        <p:cNvPr id="1" name=""/>
+        <p:cNvGrpSpPr/>
+        <p:nvPr/>
+      </p:nvGrpSpPr>
+      <p:grpSpPr>
+        <a:xfrm>
+          <a:off x="0" y="0"/>
+          <a:ext cx="0" cy="0"/>
+          <a:chOff x="0" y="0"/>
+          <a:chExt cx="0" cy="0"/>
+        </a:xfrm>
+      </p:grpSpPr>
+      <p:sp>
+        <p:nvSpPr>
+          <p:cNvPr id="2" name="Slide Image Placeholder 1"/>
+          <p:cNvSpPr>
+            <a:spLocks noGrp="1" noRot="1" noChangeAspect="1"/>
+          </p:cNvSpPr>
+          <p:nvPr>
+            <p:ph type="sldImg"/>
+          </p:nvPr>
+        </p:nvSpPr>
+        <p:spPr/>
+      </p:sp>
+      <p:sp>
+        <p:nvSpPr>
+          <p:cNvPr id="3" name="Notes Placeholder 2"/>
+          <p:cNvSpPr>
+            <a:spLocks noGrp="1"/>
+          </p:cNvSpPr>
+          <p:nvPr>
+            <p:ph type="body" idx="1"/>
+          </p:nvPr>
+        </p:nvSpPr>
+        <p:spPr/>
+        <p:txBody>
+          <a:bodyPr/>
+          <a:lstStyle/>
+          <a:p>
+            <a:pPr lvl="0" marL="0" indent="0">
+              <a:buNone/>
+            </a:pPr>
+            <a:r>
+              <a:rPr/>
+              <a:t>This</a:t>
+            </a:r>
+            <a:r>
+              <a:rPr/>
+              <a:t> </a:t>
+            </a:r>
+            <a:r>
+              <a:rPr/>
+              <a:t>is</a:t>
+            </a:r>
+            <a:r>
+              <a:rPr/>
+              <a:t> </a:t>
+            </a:r>
+            <a:r>
+              <a:rPr/>
+              <a:t>what</a:t>
+            </a:r>
+            <a:r>
+              <a:rPr/>
+              <a:t> </a:t>
+            </a:r>
+            <a:r>
+              <a:rPr/>
+              <a:t>the</a:t>
+            </a:r>
+            <a:r>
+              <a:rPr/>
+              <a:t> </a:t>
+            </a:r>
+            <a:r>
+              <a:rPr/>
+              <a:t>Python</a:t>
+            </a:r>
+            <a:r>
+              <a:rPr/>
+              <a:t> </a:t>
+            </a:r>
+            <a:r>
+              <a:rPr/>
+              <a:t>normalized</a:t>
+            </a:r>
+            <a:r>
+              <a:rPr/>
+              <a:t> </a:t>
+            </a:r>
+            <a:r>
+              <a:rPr/>
+              <a:t>barchart</a:t>
+            </a:r>
+            <a:r>
+              <a:rPr/>
+              <a:t> </a:t>
+            </a:r>
+            <a:r>
+              <a:rPr/>
+              <a:t>looks</a:t>
+            </a:r>
+            <a:r>
+              <a:rPr/>
+              <a:t> </a:t>
+            </a:r>
+            <a:r>
+              <a:rPr/>
+              <a:t>like.</a:t>
+            </a:r>
+          </a:p>
+        </p:txBody>
+      </p:sp>
+      <p:sp>
+        <p:nvSpPr>
+          <p:cNvPr id="4" name="Slide Number Placeholder 3"/>
+          <p:cNvSpPr>
+            <a:spLocks noGrp="1"/>
+          </p:cNvSpPr>
+          <p:nvPr>
+            <p:ph type="sldNum" sz="quarter" idx="10"/>
+          </p:nvPr>
+        </p:nvSpPr>
+        <p:spPr/>
+        <p:txBody>
+          <a:bodyPr/>
+          <a:lstStyle/>
+          <a:p>
+            <a:fld id="{18BDFEC3-8487-43E8-A154-7C12CBC1FFF2}" type="slidenum">
+              <a:rPr lang="en-US"/>
+              <a:t>4</a:t>
+            </a:fld>
+            <a:endParaRPr lang="en-US"/>
+          </a:p>
+        </p:txBody>
+      </p:sp>
+    </p:spTree>
+  </p:cSld>
+</p:notes>
+</file>
+
+<file path=ppt/notesSlides/notesSlide4.xml><?xml version="1.0" encoding="utf-8"?>
+<p:notes xmlns:a="http://schemas.openxmlformats.org/drawingml/2006/main" xmlns:r="http://schemas.openxmlformats.org/officeDocument/2006/relationships" xmlns:p="http://schemas.openxmlformats.org/presentationml/2006/main">
+  <p:cSld>
+    <p:spTree>
+      <p:nvGrpSpPr>
+        <p:cNvPr id="1" name=""/>
+        <p:cNvGrpSpPr/>
+        <p:nvPr/>
+      </p:nvGrpSpPr>
+      <p:grpSpPr>
+        <a:xfrm>
+          <a:off x="0" y="0"/>
+          <a:ext cx="0" cy="0"/>
+          <a:chOff x="0" y="0"/>
+          <a:chExt cx="0" cy="0"/>
+        </a:xfrm>
+      </p:grpSpPr>
+      <p:sp>
+        <p:nvSpPr>
+          <p:cNvPr id="2" name="Slide Image Placeholder 1"/>
+          <p:cNvSpPr>
+            <a:spLocks noGrp="1" noRot="1" noChangeAspect="1"/>
+          </p:cNvSpPr>
+          <p:nvPr>
+            <p:ph type="sldImg"/>
+          </p:nvPr>
+        </p:nvSpPr>
+        <p:spPr/>
+      </p:sp>
+      <p:sp>
+        <p:nvSpPr>
+          <p:cNvPr id="3" name="Notes Placeholder 2"/>
+          <p:cNvSpPr>
+            <a:spLocks noGrp="1"/>
+          </p:cNvSpPr>
+          <p:nvPr>
+            <p:ph type="body" idx="1"/>
+          </p:nvPr>
+        </p:nvSpPr>
+        <p:spPr/>
+        <p:txBody>
+          <a:bodyPr/>
+          <a:lstStyle/>
+          <a:p>
+            <a:pPr lvl="0" marL="0" indent="0">
+              <a:buNone/>
+            </a:pPr>
+            <a:r>
+              <a:rPr/>
+              <a:t>This</a:t>
+            </a:r>
+            <a:r>
+              <a:rPr/>
+              <a:t> </a:t>
+            </a:r>
+            <a:r>
+              <a:rPr/>
+              <a:t>is</a:t>
+            </a:r>
+            <a:r>
+              <a:rPr/>
+              <a:t> </a:t>
+            </a:r>
+            <a:r>
+              <a:rPr/>
+              <a:t>what</a:t>
+            </a:r>
+            <a:r>
+              <a:rPr/>
+              <a:t> </a:t>
+            </a:r>
+            <a:r>
+              <a:rPr/>
+              <a:t>the</a:t>
+            </a:r>
+            <a:r>
+              <a:rPr/>
+              <a:t> </a:t>
+            </a:r>
+            <a:r>
+              <a:rPr/>
+              <a:t>alternate</a:t>
+            </a:r>
+            <a:r>
+              <a:rPr/>
+              <a:t> </a:t>
+            </a:r>
+            <a:r>
+              <a:rPr/>
+              <a:t>version</a:t>
+            </a:r>
+            <a:r>
+              <a:rPr/>
+              <a:t> </a:t>
+            </a:r>
+            <a:r>
+              <a:rPr/>
+              <a:t>of</a:t>
+            </a:r>
+            <a:r>
+              <a:rPr/>
+              <a:t> </a:t>
+            </a:r>
+            <a:r>
+              <a:rPr/>
+              <a:t>the</a:t>
+            </a:r>
+            <a:r>
+              <a:rPr/>
+              <a:t> </a:t>
+            </a:r>
+            <a:r>
+              <a:rPr/>
+              <a:t>Python</a:t>
+            </a:r>
+            <a:r>
+              <a:rPr/>
+              <a:t> </a:t>
+            </a:r>
+            <a:r>
+              <a:rPr/>
+              <a:t>normalized</a:t>
+            </a:r>
+            <a:r>
+              <a:rPr/>
+              <a:t> </a:t>
+            </a:r>
+            <a:r>
+              <a:rPr/>
+              <a:t>barchart.</a:t>
+            </a:r>
+          </a:p>
+        </p:txBody>
+      </p:sp>
+      <p:sp>
+        <p:nvSpPr>
+          <p:cNvPr id="4" name="Slide Number Placeholder 3"/>
+          <p:cNvSpPr>
+            <a:spLocks noGrp="1"/>
+          </p:cNvSpPr>
+          <p:nvPr>
+            <p:ph type="sldNum" sz="quarter" idx="10"/>
+          </p:nvPr>
+        </p:nvSpPr>
+        <p:spPr/>
+        <p:txBody>
+          <a:bodyPr/>
+          <a:lstStyle/>
+          <a:p>
+            <a:fld id="{18BDFEC3-8487-43E8-A154-7C12CBC1FFF2}" type="slidenum">
+              <a:rPr lang="en-US"/>
+              <a:t>5</a:t>
+            </a:fld>
+            <a:endParaRPr lang="en-US"/>
+          </a:p>
+        </p:txBody>
+      </p:sp>
+    </p:spTree>
+  </p:cSld>
+</p:notes>
+</file>
+
+<file path=ppt/notesSlides/notesSlide5.xml><?xml version="1.0" encoding="utf-8"?>
+<p:notes xmlns:a="http://schemas.openxmlformats.org/drawingml/2006/main" xmlns:r="http://schemas.openxmlformats.org/officeDocument/2006/relationships" xmlns:p="http://schemas.openxmlformats.org/presentationml/2006/main">
+  <p:cSld>
+    <p:spTree>
+      <p:nvGrpSpPr>
+        <p:cNvPr id="1" name=""/>
+        <p:cNvGrpSpPr/>
+        <p:nvPr/>
+      </p:nvGrpSpPr>
+      <p:grpSpPr>
+        <a:xfrm>
+          <a:off x="0" y="0"/>
+          <a:ext cx="0" cy="0"/>
+          <a:chOff x="0" y="0"/>
+          <a:chExt cx="0" cy="0"/>
+        </a:xfrm>
+      </p:grpSpPr>
+      <p:sp>
+        <p:nvSpPr>
+          <p:cNvPr id="2" name="Slide Image Placeholder 1"/>
+          <p:cNvSpPr>
+            <a:spLocks noGrp="1" noRot="1" noChangeAspect="1"/>
+          </p:cNvSpPr>
+          <p:nvPr>
+            <p:ph type="sldImg"/>
+          </p:nvPr>
+        </p:nvSpPr>
+        <p:spPr/>
+      </p:sp>
+      <p:sp>
+        <p:nvSpPr>
+          <p:cNvPr id="3" name="Notes Placeholder 2"/>
+          <p:cNvSpPr>
+            <a:spLocks noGrp="1"/>
+          </p:cNvSpPr>
+          <p:nvPr>
+            <p:ph type="body" idx="1"/>
+          </p:nvPr>
+        </p:nvSpPr>
+        <p:spPr/>
+        <p:txBody>
+          <a:bodyPr/>
+          <a:lstStyle/>
+          <a:p>
+            <a:pPr lvl="0" marL="0" indent="0">
+              <a:buNone/>
+            </a:pPr>
+            <a:r>
+              <a:rPr/>
+              <a:t>Here</a:t>
+            </a:r>
+            <a:r>
+              <a:rPr/>
+              <a:t> </a:t>
+            </a:r>
+            <a:r>
+              <a:rPr/>
+              <a:t>is</a:t>
+            </a:r>
+            <a:r>
+              <a:rPr/>
+              <a:t> </a:t>
+            </a:r>
+            <a:r>
+              <a:rPr/>
+              <a:t>the</a:t>
+            </a:r>
+            <a:r>
+              <a:rPr/>
+              <a:t> </a:t>
+            </a:r>
+            <a:r>
+              <a:rPr/>
+              <a:t>R</a:t>
+            </a:r>
+            <a:r>
+              <a:rPr/>
+              <a:t> </a:t>
+            </a:r>
+            <a:r>
+              <a:rPr/>
+              <a:t>output.</a:t>
+            </a:r>
+          </a:p>
+        </p:txBody>
+      </p:sp>
+      <p:sp>
+        <p:nvSpPr>
+          <p:cNvPr id="4" name="Slide Number Placeholder 3"/>
+          <p:cNvSpPr>
+            <a:spLocks noGrp="1"/>
+          </p:cNvSpPr>
+          <p:nvPr>
+            <p:ph type="sldNum" sz="quarter" idx="10"/>
+          </p:nvPr>
+        </p:nvSpPr>
+        <p:spPr/>
+        <p:txBody>
+          <a:bodyPr/>
+          <a:lstStyle/>
+          <a:p>
+            <a:fld id="{18BDFEC3-8487-43E8-A154-7C12CBC1FFF2}" type="slidenum">
+              <a:rPr lang="en-US"/>
+              <a:t>7</a:t>
+            </a:fld>
+            <a:endParaRPr lang="en-US"/>
+          </a:p>
+        </p:txBody>
+      </p:sp>
+    </p:spTree>
+  </p:cSld>
+</p:notes>
+</file>
+
+<file path=ppt/notesSlides/notesSlide6.xml><?xml version="1.0" encoding="utf-8"?>
+<p:notes xmlns:a="http://schemas.openxmlformats.org/drawingml/2006/main" xmlns:r="http://schemas.openxmlformats.org/officeDocument/2006/relationships" xmlns:p="http://schemas.openxmlformats.org/presentationml/2006/main">
+  <p:cSld>
+    <p:spTree>
+      <p:nvGrpSpPr>
+        <p:cNvPr id="1" name=""/>
+        <p:cNvGrpSpPr/>
+        <p:nvPr/>
+      </p:nvGrpSpPr>
+      <p:grpSpPr>
+        <a:xfrm>
+          <a:off x="0" y="0"/>
+          <a:ext cx="0" cy="0"/>
+          <a:chOff x="0" y="0"/>
+          <a:chExt cx="0" cy="0"/>
+        </a:xfrm>
+      </p:grpSpPr>
+      <p:sp>
+        <p:nvSpPr>
+          <p:cNvPr id="2" name="Slide Image Placeholder 1"/>
+          <p:cNvSpPr>
+            <a:spLocks noGrp="1" noRot="1" noChangeAspect="1"/>
+          </p:cNvSpPr>
+          <p:nvPr>
+            <p:ph type="sldImg"/>
+          </p:nvPr>
+        </p:nvSpPr>
+        <p:spPr/>
+      </p:sp>
+      <p:sp>
+        <p:nvSpPr>
+          <p:cNvPr id="3" name="Notes Placeholder 2"/>
+          <p:cNvSpPr>
+            <a:spLocks noGrp="1"/>
+          </p:cNvSpPr>
+          <p:nvPr>
+            <p:ph type="body" idx="1"/>
+          </p:nvPr>
+        </p:nvSpPr>
+        <p:spPr/>
+        <p:txBody>
+          <a:bodyPr/>
+          <a:lstStyle/>
+          <a:p>
+            <a:pPr lvl="0" marL="0" indent="0">
+              <a:buNone/>
+            </a:pPr>
+            <a:r>
+              <a:rPr/>
+              <a:t>Here</a:t>
+            </a:r>
+            <a:r>
+              <a:rPr/>
+              <a:t> </a:t>
+            </a:r>
+            <a:r>
+              <a:rPr/>
+              <a:t>is</a:t>
+            </a:r>
+            <a:r>
+              <a:rPr/>
+              <a:t> </a:t>
+            </a:r>
+            <a:r>
+              <a:rPr/>
+              <a:t>the</a:t>
+            </a:r>
+            <a:r>
+              <a:rPr/>
+              <a:t> </a:t>
+            </a:r>
+            <a:r>
+              <a:rPr/>
+              <a:t>alternate</a:t>
+            </a:r>
+            <a:r>
+              <a:rPr/>
+              <a:t> </a:t>
+            </a:r>
+            <a:r>
+              <a:rPr/>
+              <a:t>version.</a:t>
+            </a:r>
+          </a:p>
+        </p:txBody>
+      </p:sp>
+      <p:sp>
+        <p:nvSpPr>
+          <p:cNvPr id="4" name="Slide Number Placeholder 3"/>
+          <p:cNvSpPr>
+            <a:spLocks noGrp="1"/>
+          </p:cNvSpPr>
+          <p:nvPr>
+            <p:ph type="sldNum" sz="quarter" idx="10"/>
+          </p:nvPr>
+        </p:nvSpPr>
+        <p:spPr/>
+        <p:txBody>
+          <a:bodyPr/>
+          <a:lstStyle/>
+          <a:p>
+            <a:fld id="{18BDFEC3-8487-43E8-A154-7C12CBC1FFF2}" type="slidenum">
+              <a:rPr lang="en-US"/>
+              <a:t>8</a:t>
+            </a:fld>
+            <a:endParaRPr lang="en-US"/>
+          </a:p>
+        </p:txBody>
+      </p:sp>
+    </p:spTree>
+  </p:cSld>
+</p:notes>
+</file>
+
+<file path=ppt/notesSlides/notesSlide7.xml><?xml version="1.0" encoding="utf-8"?>
+<p:notes xmlns:a="http://schemas.openxmlformats.org/drawingml/2006/main" xmlns:r="http://schemas.openxmlformats.org/officeDocument/2006/relationships" xmlns:p="http://schemas.openxmlformats.org/presentationml/2006/main">
+  <p:cSld>
+    <p:spTree>
+      <p:nvGrpSpPr>
+        <p:cNvPr id="1" name=""/>
+        <p:cNvGrpSpPr/>
+        <p:nvPr/>
+      </p:nvGrpSpPr>
+      <p:grpSpPr>
+        <a:xfrm>
+          <a:off x="0" y="0"/>
+          <a:ext cx="0" cy="0"/>
+          <a:chOff x="0" y="0"/>
+          <a:chExt cx="0" cy="0"/>
+        </a:xfrm>
+      </p:grpSpPr>
+      <p:sp>
+        <p:nvSpPr>
+          <p:cNvPr id="2" name="Slide Image Placeholder 1"/>
+          <p:cNvSpPr>
+            <a:spLocks noGrp="1" noRot="1" noChangeAspect="1"/>
+          </p:cNvSpPr>
+          <p:nvPr>
+            <p:ph type="sldImg"/>
+          </p:nvPr>
+        </p:nvSpPr>
+        <p:spPr/>
+      </p:sp>
+      <p:sp>
+        <p:nvSpPr>
+          <p:cNvPr id="3" name="Notes Placeholder 2"/>
+          <p:cNvSpPr>
+            <a:spLocks noGrp="1"/>
+          </p:cNvSpPr>
+          <p:nvPr>
+            <p:ph type="body" idx="1"/>
+          </p:nvPr>
+        </p:nvSpPr>
+        <p:spPr/>
+        <p:txBody>
+          <a:bodyPr/>
+          <a:lstStyle/>
+          <a:p>
+            <a:pPr lvl="0" marL="0" indent="0">
+              <a:buNone/>
+            </a:pPr>
+            <a:r>
+              <a:rPr/>
+              <a:t>Here</a:t>
+            </a:r>
+            <a:r>
+              <a:rPr/>
+              <a:t> </a:t>
+            </a:r>
+            <a:r>
+              <a:rPr/>
+              <a:t>is</a:t>
+            </a:r>
+            <a:r>
+              <a:rPr/>
+              <a:t> </a:t>
+            </a:r>
+            <a:r>
+              <a:rPr/>
+              <a:t>the</a:t>
+            </a:r>
+            <a:r>
+              <a:rPr/>
+              <a:t> </a:t>
+            </a:r>
+            <a:r>
+              <a:rPr/>
+              <a:t>Tableau</a:t>
+            </a:r>
+            <a:r>
+              <a:rPr/>
+              <a:t> </a:t>
+            </a:r>
+            <a:r>
+              <a:rPr/>
+              <a:t>output.</a:t>
+            </a:r>
+          </a:p>
+        </p:txBody>
+      </p:sp>
+      <p:sp>
+        <p:nvSpPr>
+          <p:cNvPr id="4" name="Slide Number Placeholder 3"/>
+          <p:cNvSpPr>
+            <a:spLocks noGrp="1"/>
+          </p:cNvSpPr>
+          <p:nvPr>
+            <p:ph type="sldNum" sz="quarter" idx="10"/>
+          </p:nvPr>
+        </p:nvSpPr>
+        <p:spPr/>
+        <p:txBody>
+          <a:bodyPr/>
+          <a:lstStyle/>
+          <a:p>
+            <a:fld id="{18BDFEC3-8487-43E8-A154-7C12CBC1FFF2}" type="slidenum">
+              <a:rPr lang="en-US"/>
+              <a:t>9</a:t>
+            </a:fld>
+            <a:endParaRPr lang="en-US"/>
+          </a:p>
+        </p:txBody>
+      </p:sp>
+    </p:spTree>
+  </p:cSld>
+</p:notes>
+</file>
+
+<file path=ppt/notesSlides/notesSlide8.xml><?xml version="1.0" encoding="utf-8"?>
+<p:notes xmlns:a="http://schemas.openxmlformats.org/drawingml/2006/main" xmlns:r="http://schemas.openxmlformats.org/officeDocument/2006/relationships" xmlns:p="http://schemas.openxmlformats.org/presentationml/2006/main">
+  <p:cSld>
+    <p:spTree>
+      <p:nvGrpSpPr>
+        <p:cNvPr id="1" name=""/>
+        <p:cNvGrpSpPr/>
+        <p:nvPr/>
+      </p:nvGrpSpPr>
+      <p:grpSpPr>
+        <a:xfrm>
+          <a:off x="0" y="0"/>
+          <a:ext cx="0" cy="0"/>
+          <a:chOff x="0" y="0"/>
+          <a:chExt cx="0" cy="0"/>
+        </a:xfrm>
+      </p:grpSpPr>
+      <p:sp>
+        <p:nvSpPr>
+          <p:cNvPr id="2" name="Slide Image Placeholder 1"/>
+          <p:cNvSpPr>
+            <a:spLocks noGrp="1" noRot="1" noChangeAspect="1"/>
+          </p:cNvSpPr>
+          <p:nvPr>
+            <p:ph type="sldImg"/>
+          </p:nvPr>
+        </p:nvSpPr>
+        <p:spPr/>
+      </p:sp>
+      <p:sp>
+        <p:nvSpPr>
+          <p:cNvPr id="3" name="Notes Placeholder 2"/>
+          <p:cNvSpPr>
+            <a:spLocks noGrp="1"/>
+          </p:cNvSpPr>
+          <p:nvPr>
+            <p:ph type="body" idx="1"/>
+          </p:nvPr>
+        </p:nvSpPr>
+        <p:spPr/>
+        <p:txBody>
+          <a:bodyPr/>
+          <a:lstStyle/>
+          <a:p>
+            <a:pPr lvl="0" marL="0" indent="0">
+              <a:buNone/>
+            </a:pPr>
+            <a:r>
+              <a:rPr/>
+              <a:t>Here</a:t>
+            </a:r>
+            <a:r>
+              <a:rPr/>
+              <a:t> </a:t>
+            </a:r>
+            <a:r>
+              <a:rPr/>
+              <a:t>is</a:t>
+            </a:r>
+            <a:r>
+              <a:rPr/>
+              <a:t> </a:t>
+            </a:r>
+            <a:r>
+              <a:rPr/>
+              <a:t>the</a:t>
+            </a:r>
+            <a:r>
+              <a:rPr/>
+              <a:t> </a:t>
+            </a:r>
+            <a:r>
+              <a:rPr/>
+              <a:t>alternate</a:t>
+            </a:r>
+            <a:r>
+              <a:rPr/>
+              <a:t> </a:t>
+            </a:r>
+            <a:r>
+              <a:rPr/>
+              <a:t>version.</a:t>
+            </a:r>
+          </a:p>
+        </p:txBody>
+      </p:sp>
+      <p:sp>
+        <p:nvSpPr>
+          <p:cNvPr id="4" name="Slide Number Placeholder 3"/>
+          <p:cNvSpPr>
+            <a:spLocks noGrp="1"/>
+          </p:cNvSpPr>
+          <p:nvPr>
+            <p:ph type="sldNum" sz="quarter" idx="10"/>
+          </p:nvPr>
+        </p:nvSpPr>
+        <p:spPr/>
+        <p:txBody>
+          <a:bodyPr/>
+          <a:lstStyle/>
+          <a:p>
+            <a:fld id="{18BDFEC3-8487-43E8-A154-7C12CBC1FFF2}" type="slidenum">
+              <a:rPr lang="en-US"/>
+              <a:t>10</a:t>
             </a:fld>
             <a:endParaRPr lang="en-US"/>
           </a:p>
@@ -4330,32 +5264,115 @@
             </a:r>
             <a:r>
               <a:rPr/>
-              <a:t>output</a:t>
-            </a:r>
-          </a:p>
-        </p:txBody>
-      </p:sp>
-      <p:sp>
-        <p:nvSpPr>
-          <p:cNvPr id="3" name="Content Placeholder 2"/>
-          <p:cNvSpPr>
-            <a:spLocks noGrp="1"/>
-          </p:cNvSpPr>
-          <p:nvPr>
-            <p:ph idx="1"/>
-          </p:nvPr>
-        </p:nvSpPr>
-        <p:spPr/>
-        <p:txBody>
-          <a:bodyPr/>
-          <a:lstStyle/>
-          <a:p>
-            <a:pPr lvl="0" marL="0" indent="0">
+              <a:t>output,</a:t>
+            </a:r>
+            <a:r>
+              <a:rPr/>
+              <a:t> </a:t>
+            </a:r>
+            <a:r>
+              <a:rPr/>
+              <a:t>sex</a:t>
+            </a:r>
+            <a:r>
+              <a:rPr/>
+              <a:t> </a:t>
+            </a:r>
+            <a:r>
+              <a:rPr/>
+              <a:t>by</a:t>
+            </a:r>
+            <a:r>
+              <a:rPr/>
+              <a:t> </a:t>
+            </a:r>
+            <a:r>
+              <a:rPr/>
+              <a:t>mortality</a:t>
+            </a:r>
+          </a:p>
+        </p:txBody>
+      </p:sp>
+      <p:pic>
+        <p:nvPicPr>
+          <p:cNvPr descr="../images/tableau/sex-by-mortality.png" id="0" name="Picture 1"/>
+          <p:cNvPicPr>
+            <a:picLocks noGrp="1" noChangeAspect="1"/>
+          </p:cNvPicPr>
+          <p:nvPr/>
+        </p:nvPicPr>
+        <p:blipFill>
+          <a:blip r:embed="rId3"/>
+          <a:stretch>
+            <a:fillRect/>
+          </a:stretch>
+        </p:blipFill>
+        <p:spPr bwMode="auto">
+          <a:xfrm>
+            <a:off x="558800" y="1600200"/>
+            <a:ext cx="8026400" cy="4013200"/>
+          </a:xfrm>
+          <a:prstGeom prst="rect">
+            <a:avLst/>
+          </a:prstGeom>
+          <a:noFill/>
+          <a:ln w="9525">
+            <a:noFill/>
+            <a:headEnd/>
+            <a:tailEnd/>
+          </a:ln>
+        </p:spPr>
+      </p:pic>
+      <p:sp>
+        <p:nvSpPr>
+          <p:cNvPr id="1" name="TextBox 3"/>
+          <p:cNvSpPr txBox="1"/>
+          <p:nvPr/>
+        </p:nvSpPr>
+        <p:spPr>
+          <a:xfrm>
+            <a:off x="457200" y="5613400"/>
+            <a:ext cx="8229600" cy="508000"/>
+          </a:xfrm>
+          <a:prstGeom prst="rect">
+            <a:avLst/>
+          </a:prstGeom>
+          <a:noFill/>
+        </p:spPr>
+        <p:txBody>
+          <a:bodyPr/>
+          <a:lstStyle/>
+          <a:p>
+            <a:pPr lvl="0" marL="0" indent="0" algn="ctr">
               <a:buNone/>
             </a:pPr>
             <a:r>
               <a:rPr/>
-              <a:t>((Tableau results))</a:t>
+              <a:t>Sex</a:t>
+            </a:r>
+            <a:r>
+              <a:rPr/>
+              <a:t> </a:t>
+            </a:r>
+            <a:r>
+              <a:rPr/>
+              <a:t>by</a:t>
+            </a:r>
+            <a:r>
+              <a:rPr/>
+              <a:t> </a:t>
+            </a:r>
+            <a:r>
+              <a:rPr/>
+              <a:t>mortality</a:t>
+            </a:r>
+            <a:r>
+              <a:rPr/>
+              <a:t> </a:t>
+            </a:r>
+            <a:r>
+              <a:rPr/>
+              <a:t>barchart</a:t>
             </a:r>
           </a:p>
         </p:txBody>
@@ -4449,7 +5466,7 @@
             <a:pPr lvl="1"/>
             <a:r>
               <a:rPr/>
-              <a:t>Draw a bar chart showing counts involving both mortality and gender. Use stacked bars, then dodged bars. Which do you like best?</a:t>
+              <a:t>Draw a bar chart showing counts involving both mortality and gender. Use normalized bars.</a:t>
             </a:r>
           </a:p>
         </p:txBody>
@@ -4538,7 +5555,33 @@
               <a:rPr sz="1800">
                 <a:latin typeface="Courier"/>
               </a:rPr>
-              <a:t>((Python code))</a:t>
+              <a:t>ch = alt.Chart(df).mark_bar().encode(
+    x='sex',
+    y=alt.Y('count()', stack='normalize'),
+    color='survived'
+)</a:t>
+            </a:r>
+          </a:p>
+          <a:p>
+            <a:pPr lvl="1"/>
+            <a:r>
+              <a:rPr/>
+              <a:t>Alternative</a:t>
+            </a:r>
+          </a:p>
+          <a:p>
+            <a:pPr lvl="0" marL="1270000" indent="0">
+              <a:buNone/>
+            </a:pPr>
+            <a:r>
+              <a:rPr sz="1800">
+                <a:latin typeface="Courier"/>
+              </a:rPr>
+              <a:t>ch = alt.Chart(df).mark_bar().encode(
+    x='survived',
+    y=alt.Y('count()', stack='normalize'),
+    color='sex'
+)</a:t>
             </a:r>
           </a:p>
         </p:txBody>
@@ -4601,32 +5644,115 @@
             </a:r>
             <a:r>
               <a:rPr/>
-              <a:t>output</a:t>
-            </a:r>
-          </a:p>
-        </p:txBody>
-      </p:sp>
-      <p:sp>
-        <p:nvSpPr>
-          <p:cNvPr id="3" name="Content Placeholder 2"/>
-          <p:cNvSpPr>
-            <a:spLocks noGrp="1"/>
-          </p:cNvSpPr>
-          <p:nvPr>
-            <p:ph idx="1"/>
-          </p:nvPr>
-        </p:nvSpPr>
-        <p:spPr/>
-        <p:txBody>
-          <a:bodyPr/>
-          <a:lstStyle/>
-          <a:p>
-            <a:pPr lvl="0" marL="0" indent="0">
+              <a:t>output,</a:t>
+            </a:r>
+            <a:r>
+              <a:rPr/>
+              <a:t> </a:t>
+            </a:r>
+            <a:r>
+              <a:rPr/>
+              <a:t>Mortality</a:t>
+            </a:r>
+            <a:r>
+              <a:rPr/>
+              <a:t> </a:t>
+            </a:r>
+            <a:r>
+              <a:rPr/>
+              <a:t>by</a:t>
+            </a:r>
+            <a:r>
+              <a:rPr/>
+              <a:t> </a:t>
+            </a:r>
+            <a:r>
+              <a:rPr/>
+              <a:t>sex</a:t>
+            </a:r>
+          </a:p>
+        </p:txBody>
+      </p:sp>
+      <p:pic>
+        <p:nvPicPr>
+          <p:cNvPr descr="../images/python/mortality-by-sex.png" id="0" name="Picture 1"/>
+          <p:cNvPicPr>
+            <a:picLocks noGrp="1" noChangeAspect="1"/>
+          </p:cNvPicPr>
+          <p:nvPr/>
+        </p:nvPicPr>
+        <p:blipFill>
+          <a:blip r:embed="rId3"/>
+          <a:stretch>
+            <a:fillRect/>
+          </a:stretch>
+        </p:blipFill>
+        <p:spPr bwMode="auto">
+          <a:xfrm>
+            <a:off x="3759200" y="1600200"/>
+            <a:ext cx="1612900" cy="4013200"/>
+          </a:xfrm>
+          <a:prstGeom prst="rect">
+            <a:avLst/>
+          </a:prstGeom>
+          <a:noFill/>
+          <a:ln w="9525">
+            <a:noFill/>
+            <a:headEnd/>
+            <a:tailEnd/>
+          </a:ln>
+        </p:spPr>
+      </p:pic>
+      <p:sp>
+        <p:nvSpPr>
+          <p:cNvPr id="1" name="TextBox 3"/>
+          <p:cNvSpPr txBox="1"/>
+          <p:nvPr/>
+        </p:nvSpPr>
+        <p:spPr>
+          <a:xfrm>
+            <a:off x="457200" y="5613400"/>
+            <a:ext cx="8229600" cy="508000"/>
+          </a:xfrm>
+          <a:prstGeom prst="rect">
+            <a:avLst/>
+          </a:prstGeom>
+          <a:noFill/>
+        </p:spPr>
+        <p:txBody>
+          <a:bodyPr/>
+          <a:lstStyle/>
+          <a:p>
+            <a:pPr lvl="0" marL="0" indent="0" algn="ctr">
               <a:buNone/>
             </a:pPr>
             <a:r>
               <a:rPr/>
-              <a:t>((Python results))</a:t>
+              <a:t>Mortality</a:t>
+            </a:r>
+            <a:r>
+              <a:rPr/>
+              <a:t> </a:t>
+            </a:r>
+            <a:r>
+              <a:rPr/>
+              <a:t>by</a:t>
+            </a:r>
+            <a:r>
+              <a:rPr/>
+              <a:t> </a:t>
+            </a:r>
+            <a:r>
+              <a:rPr/>
+              <a:t>sex</a:t>
+            </a:r>
+            <a:r>
+              <a:rPr/>
+              <a:t> </a:t>
+            </a:r>
+            <a:r>
+              <a:rPr/>
+              <a:t>barchart</a:t>
             </a:r>
           </a:p>
         </p:txBody>
@@ -4681,52 +5807,123 @@
             </a:r>
             <a:r>
               <a:rPr/>
-              <a:t>R</a:t>
-            </a:r>
-            <a:r>
-              <a:rPr/>
-              <a:t> </a:t>
-            </a:r>
-            <a:r>
-              <a:rPr/>
-              <a:t>code</a:t>
-            </a:r>
-          </a:p>
-        </p:txBody>
-      </p:sp>
-      <p:sp>
-        <p:nvSpPr>
-          <p:cNvPr id="3" name="Content Placeholder 2"/>
-          <p:cNvSpPr>
-            <a:spLocks noGrp="1"/>
-          </p:cNvSpPr>
-          <p:nvPr>
-            <p:ph idx="1"/>
-          </p:nvPr>
-        </p:nvSpPr>
-        <p:spPr/>
-        <p:txBody>
-          <a:bodyPr/>
-          <a:lstStyle/>
-          <a:p>
-            <a:pPr lvl="1"/>
-            <a:r>
-              <a:rPr/>
-              <a:t>R code</a:t>
-            </a:r>
-          </a:p>
-          <a:p>
-            <a:pPr lvl="0" marL="1270000" indent="0">
+              <a:t>Python</a:t>
+            </a:r>
+            <a:r>
+              <a:rPr/>
+              <a:t> </a:t>
+            </a:r>
+            <a:r>
+              <a:rPr/>
+              <a:t>output,</a:t>
+            </a:r>
+            <a:r>
+              <a:rPr/>
+              <a:t> </a:t>
+            </a:r>
+            <a:r>
+              <a:rPr/>
+              <a:t>Sex</a:t>
+            </a:r>
+            <a:r>
+              <a:rPr/>
+              <a:t> </a:t>
+            </a:r>
+            <a:r>
+              <a:rPr/>
+              <a:t>by</a:t>
+            </a:r>
+            <a:r>
+              <a:rPr/>
+              <a:t> </a:t>
+            </a:r>
+            <a:r>
+              <a:rPr/>
+              <a:t>mortality</a:t>
+            </a:r>
+          </a:p>
+        </p:txBody>
+      </p:sp>
+      <p:pic>
+        <p:nvPicPr>
+          <p:cNvPr descr="../images/python/sex-by-mortality.png" id="0" name="Picture 1"/>
+          <p:cNvPicPr>
+            <a:picLocks noGrp="1" noChangeAspect="1"/>
+          </p:cNvPicPr>
+          <p:nvPr/>
+        </p:nvPicPr>
+        <p:blipFill>
+          <a:blip r:embed="rId3"/>
+          <a:stretch>
+            <a:fillRect/>
+          </a:stretch>
+        </p:blipFill>
+        <p:spPr bwMode="auto">
+          <a:xfrm>
+            <a:off x="3708400" y="1600200"/>
+            <a:ext cx="1727200" cy="4013200"/>
+          </a:xfrm>
+          <a:prstGeom prst="rect">
+            <a:avLst/>
+          </a:prstGeom>
+          <a:noFill/>
+          <a:ln w="9525">
+            <a:noFill/>
+            <a:headEnd/>
+            <a:tailEnd/>
+          </a:ln>
+        </p:spPr>
+      </p:pic>
+      <p:sp>
+        <p:nvSpPr>
+          <p:cNvPr id="1" name="TextBox 3"/>
+          <p:cNvSpPr txBox="1"/>
+          <p:nvPr/>
+        </p:nvSpPr>
+        <p:spPr>
+          <a:xfrm>
+            <a:off x="457200" y="5613400"/>
+            <a:ext cx="8229600" cy="508000"/>
+          </a:xfrm>
+          <a:prstGeom prst="rect">
+            <a:avLst/>
+          </a:prstGeom>
+          <a:noFill/>
+        </p:spPr>
+        <p:txBody>
+          <a:bodyPr/>
+          <a:lstStyle/>
+          <a:p>
+            <a:pPr lvl="0" marL="0" indent="0" algn="ctr">
               <a:buNone/>
             </a:pPr>
             <a:r>
-              <a:rPr sz="1800">
-                <a:latin typeface="Courier"/>
-              </a:rPr>
-              <a:t>titanic %&gt;%
-  ggplot(aes(x=sex, fill=survived)) +
-    geom_bar() +
-    facet_grid(cols=vars(survived))</a:t>
+              <a:rPr/>
+              <a:t>Sex</a:t>
+            </a:r>
+            <a:r>
+              <a:rPr/>
+              <a:t> </a:t>
+            </a:r>
+            <a:r>
+              <a:rPr/>
+              <a:t>by</a:t>
+            </a:r>
+            <a:r>
+              <a:rPr/>
+              <a:t> </a:t>
+            </a:r>
+            <a:r>
+              <a:rPr/>
+              <a:t>mortality</a:t>
+            </a:r>
+            <a:r>
+              <a:rPr/>
+              <a:t> </a:t>
+            </a:r>
+            <a:r>
+              <a:rPr/>
+              <a:t>barchart</a:t>
             </a:r>
           </a:p>
         </p:txBody>
@@ -4789,41 +5986,65 @@
             </a:r>
             <a:r>
               <a:rPr/>
-              <a:t>output</a:t>
-            </a:r>
-          </a:p>
-        </p:txBody>
-      </p:sp>
-      <p:pic>
-        <p:nvPicPr>
-          <p:cNvPr descr="../images/r/stack-1.png" id="0" name="Picture 1"/>
-          <p:cNvPicPr>
-            <a:picLocks noGrp="1" noChangeAspect="1"/>
-          </p:cNvPicPr>
-          <p:nvPr/>
-        </p:nvPicPr>
-        <p:blipFill>
-          <a:blip r:embed="rId2"/>
-          <a:stretch>
-            <a:fillRect/>
-          </a:stretch>
-        </p:blipFill>
-        <p:spPr bwMode="auto">
-          <a:xfrm>
-            <a:off x="2311400" y="1600200"/>
-            <a:ext cx="4521200" cy="4521200"/>
-          </a:xfrm>
-          <a:prstGeom prst="rect">
-            <a:avLst/>
-          </a:prstGeom>
-          <a:noFill/>
-          <a:ln w="9525">
-            <a:noFill/>
-            <a:headEnd/>
-            <a:tailEnd/>
-          </a:ln>
-        </p:spPr>
-      </p:pic>
+              <a:t>code</a:t>
+            </a:r>
+          </a:p>
+        </p:txBody>
+      </p:sp>
+      <p:sp>
+        <p:nvSpPr>
+          <p:cNvPr id="3" name="Content Placeholder 2"/>
+          <p:cNvSpPr>
+            <a:spLocks noGrp="1"/>
+          </p:cNvSpPr>
+          <p:nvPr>
+            <p:ph idx="1"/>
+          </p:nvPr>
+        </p:nvSpPr>
+        <p:spPr/>
+        <p:txBody>
+          <a:bodyPr/>
+          <a:lstStyle/>
+          <a:p>
+            <a:pPr lvl="1"/>
+            <a:r>
+              <a:rPr/>
+              <a:t>R code</a:t>
+            </a:r>
+          </a:p>
+          <a:p>
+            <a:pPr lvl="0" marL="1270000" indent="0">
+              <a:buNone/>
+            </a:pPr>
+            <a:r>
+              <a:rPr sz="1800">
+                <a:latin typeface="Courier"/>
+              </a:rPr>
+              <a:t>ggplot(titanic, aes(x=survived, fill=sex)) +
+  geom_bar(position="normalize")</a:t>
+            </a:r>
+          </a:p>
+          <a:p>
+            <a:pPr lvl="1"/>
+            <a:r>
+              <a:rPr/>
+              <a:t>Alternate version</a:t>
+            </a:r>
+          </a:p>
+          <a:p>
+            <a:pPr lvl="0" marL="1270000" indent="0">
+              <a:buNone/>
+            </a:pPr>
+            <a:r>
+              <a:rPr sz="1800">
+                <a:latin typeface="Courier"/>
+              </a:rPr>
+              <a:t>ggplot(titanic, aes(x=sex, fill=survived)) +
+  geom_bar(position="normalize")</a:t>
+            </a:r>
+          </a:p>
+        </p:txBody>
+      </p:sp>
     </p:spTree>
   </p:cSld>
 </p:sld>
@@ -4882,21 +6103,45 @@
             </a:r>
             <a:r>
               <a:rPr/>
-              <a:t>output</a:t>
+              <a:t>output,</a:t>
+            </a:r>
+            <a:r>
+              <a:rPr/>
+              <a:t> </a:t>
+            </a:r>
+            <a:r>
+              <a:rPr/>
+              <a:t>Mortality</a:t>
+            </a:r>
+            <a:r>
+              <a:rPr/>
+              <a:t> </a:t>
+            </a:r>
+            <a:r>
+              <a:rPr/>
+              <a:t>by</a:t>
+            </a:r>
+            <a:r>
+              <a:rPr/>
+              <a:t> </a:t>
+            </a:r>
+            <a:r>
+              <a:rPr/>
+              <a:t>sex</a:t>
             </a:r>
           </a:p>
         </p:txBody>
       </p:sp>
       <p:pic>
         <p:nvPicPr>
-          <p:cNvPr descr="../images/r/stack-2.png" id="0" name="Picture 1"/>
+          <p:cNvPr descr="../images/r/mortality-by-sex.png" id="0" name="Picture 1"/>
           <p:cNvPicPr>
             <a:picLocks noGrp="1" noChangeAspect="1"/>
           </p:cNvPicPr>
           <p:nvPr/>
         </p:nvPicPr>
         <p:blipFill>
-          <a:blip r:embed="rId2"/>
+          <a:blip r:embed="rId3"/>
           <a:stretch>
             <a:fillRect/>
           </a:stretch>
@@ -4975,21 +6220,45 @@
             </a:r>
             <a:r>
               <a:rPr/>
-              <a:t>output</a:t>
+              <a:t>output,</a:t>
+            </a:r>
+            <a:r>
+              <a:rPr/>
+              <a:t> </a:t>
+            </a:r>
+            <a:r>
+              <a:rPr/>
+              <a:t>Sex</a:t>
+            </a:r>
+            <a:r>
+              <a:rPr/>
+              <a:t> </a:t>
+            </a:r>
+            <a:r>
+              <a:rPr/>
+              <a:t>by</a:t>
+            </a:r>
+            <a:r>
+              <a:rPr/>
+              <a:t> </a:t>
+            </a:r>
+            <a:r>
+              <a:rPr/>
+              <a:t>mortality</a:t>
             </a:r>
           </a:p>
         </p:txBody>
       </p:sp>
       <p:pic>
         <p:nvPicPr>
-          <p:cNvPr descr="../images/r/dodge-1.png" id="0" name="Picture 1"/>
+          <p:cNvPr descr="../images/r/sex-by-mortality.png" id="0" name="Picture 1"/>
           <p:cNvPicPr>
             <a:picLocks noGrp="1" noChangeAspect="1"/>
           </p:cNvPicPr>
           <p:nvPr/>
         </p:nvPicPr>
         <p:blipFill>
-          <a:blip r:embed="rId2"/>
+          <a:blip r:embed="rId3"/>
           <a:stretch>
             <a:fillRect/>
           </a:stretch>
@@ -5060,37 +6329,61 @@
             </a:r>
             <a:r>
               <a:rPr/>
-              <a:t>R</a:t>
-            </a:r>
-            <a:r>
-              <a:rPr/>
-              <a:t> </a:t>
-            </a:r>
-            <a:r>
-              <a:rPr/>
-              <a:t>output</a:t>
+              <a:t>Tableau</a:t>
+            </a:r>
+            <a:r>
+              <a:rPr/>
+              <a:t> </a:t>
+            </a:r>
+            <a:r>
+              <a:rPr/>
+              <a:t>output,</a:t>
+            </a:r>
+            <a:r>
+              <a:rPr/>
+              <a:t> </a:t>
+            </a:r>
+            <a:r>
+              <a:rPr/>
+              <a:t>mortality</a:t>
+            </a:r>
+            <a:r>
+              <a:rPr/>
+              <a:t> </a:t>
+            </a:r>
+            <a:r>
+              <a:rPr/>
+              <a:t>by</a:t>
+            </a:r>
+            <a:r>
+              <a:rPr/>
+              <a:t> </a:t>
+            </a:r>
+            <a:r>
+              <a:rPr/>
+              <a:t>sex</a:t>
             </a:r>
           </a:p>
         </p:txBody>
       </p:sp>
       <p:pic>
         <p:nvPicPr>
-          <p:cNvPr descr="../images/r/dodge-2.png" id="0" name="Picture 1"/>
+          <p:cNvPr descr="../images/tableau/mortality-by-sex.png" id="0" name="Picture 1"/>
           <p:cNvPicPr>
             <a:picLocks noGrp="1" noChangeAspect="1"/>
           </p:cNvPicPr>
           <p:nvPr/>
         </p:nvPicPr>
         <p:blipFill>
-          <a:blip r:embed="rId2"/>
+          <a:blip r:embed="rId3"/>
           <a:stretch>
             <a:fillRect/>
           </a:stretch>
         </p:blipFill>
         <p:spPr bwMode="auto">
           <a:xfrm>
-            <a:off x="2311400" y="1600200"/>
-            <a:ext cx="4521200" cy="4521200"/>
+            <a:off x="558800" y="1600200"/>
+            <a:ext cx="8026400" cy="4013200"/>
           </a:xfrm>
           <a:prstGeom prst="rect">
             <a:avLst/>
@@ -5103,6 +6396,60 @@
           </a:ln>
         </p:spPr>
       </p:pic>
+      <p:sp>
+        <p:nvSpPr>
+          <p:cNvPr id="1" name="TextBox 3"/>
+          <p:cNvSpPr txBox="1"/>
+          <p:nvPr/>
+        </p:nvSpPr>
+        <p:spPr>
+          <a:xfrm>
+            <a:off x="457200" y="5613400"/>
+            <a:ext cx="8229600" cy="508000"/>
+          </a:xfrm>
+          <a:prstGeom prst="rect">
+            <a:avLst/>
+          </a:prstGeom>
+          <a:noFill/>
+        </p:spPr>
+        <p:txBody>
+          <a:bodyPr/>
+          <a:lstStyle/>
+          <a:p>
+            <a:pPr lvl="0" marL="0" indent="0" algn="ctr">
+              <a:buNone/>
+            </a:pPr>
+            <a:r>
+              <a:rPr/>
+              <a:t>Mortality</a:t>
+            </a:r>
+            <a:r>
+              <a:rPr/>
+              <a:t> </a:t>
+            </a:r>
+            <a:r>
+              <a:rPr/>
+              <a:t>by</a:t>
+            </a:r>
+            <a:r>
+              <a:rPr/>
+              <a:t> </a:t>
+            </a:r>
+            <a:r>
+              <a:rPr/>
+              <a:t>sex</a:t>
+            </a:r>
+            <a:r>
+              <a:rPr/>
+              <a:t> </a:t>
+            </a:r>
+            <a:r>
+              <a:rPr/>
+              <a:t>barchart</a:t>
+            </a:r>
+          </a:p>
+        </p:txBody>
+      </p:sp>
     </p:spTree>
   </p:cSld>
 </p:sld>

</xml_diff>